<commit_message>
Correzioni richieste dal professore.
Versione reinviata al professore
</commit_message>
<xml_diff>
--- a/presentazione/Pptx/Lahmer_Abdelilah_presentazione.pptx
+++ b/presentazione/Pptx/Lahmer_Abdelilah_presentazione.pptx
@@ -5,7 +5,7 @@
     <p:sldMasterId id="2147483648" r:id="rId1"/>
   </p:sldMasterIdLst>
   <p:notesMasterIdLst>
-    <p:notesMasterId r:id="rId17"/>
+    <p:notesMasterId r:id="rId16"/>
   </p:notesMasterIdLst>
   <p:sldIdLst>
     <p:sldId id="256" r:id="rId2"/>
@@ -22,7 +22,6 @@
     <p:sldId id="286" r:id="rId13"/>
     <p:sldId id="287" r:id="rId14"/>
     <p:sldId id="281" r:id="rId15"/>
-    <p:sldId id="282" r:id="rId16"/>
   </p:sldIdLst>
   <p:sldSz cx="9144000" cy="6858000" type="screen4x3"/>
   <p:notesSz cx="6858000" cy="9144000"/>
@@ -2060,7 +2059,7 @@
           </a:ln>
           <a:extLst>
             <a:ext uri="{C572A759-6A51-4108-AA02-DFA0A04FC94B}">
-              <ma14:wrappingTextBoxFlag xmlns="" xmlns:ma14="http://schemas.microsoft.com/office/mac/drawingml/2011/main" val="1"/>
+              <ma14:wrappingTextBoxFlag xmlns:ma14="http://schemas.microsoft.com/office/mac/drawingml/2011/main" xmlns="" val="1"/>
             </a:ext>
           </a:extLst>
         </p:spPr>
@@ -2103,7 +2102,7 @@
           </a:ln>
           <a:extLst>
             <a:ext uri="{C572A759-6A51-4108-AA02-DFA0A04FC94B}">
-              <ma14:wrappingTextBoxFlag xmlns="" xmlns:ma14="http://schemas.microsoft.com/office/mac/drawingml/2011/main" val="1"/>
+              <ma14:wrappingTextBoxFlag xmlns:ma14="http://schemas.microsoft.com/office/mac/drawingml/2011/main" xmlns="" val="1"/>
             </a:ext>
           </a:extLst>
         </p:spPr>
@@ -2619,7 +2618,7 @@
           </a:ln>
           <a:extLst>
             <a:ext uri="{C572A759-6A51-4108-AA02-DFA0A04FC94B}">
-              <ma14:wrappingTextBoxFlag xmlns="" xmlns:ma14="http://schemas.microsoft.com/office/mac/drawingml/2011/main" val="1"/>
+              <ma14:wrappingTextBoxFlag xmlns:ma14="http://schemas.microsoft.com/office/mac/drawingml/2011/main" xmlns="" val="1"/>
             </a:ext>
           </a:extLst>
         </p:spPr>
@@ -2730,7 +2729,7 @@
           </a:ln>
           <a:extLst>
             <a:ext uri="{C572A759-6A51-4108-AA02-DFA0A04FC94B}">
-              <ma14:wrappingTextBoxFlag xmlns="" xmlns:ma14="http://schemas.microsoft.com/office/mac/drawingml/2011/main" val="1"/>
+              <ma14:wrappingTextBoxFlag xmlns:ma14="http://schemas.microsoft.com/office/mac/drawingml/2011/main" xmlns="" val="1"/>
             </a:ext>
           </a:extLst>
         </p:spPr>
@@ -2780,7 +2779,7 @@
           </a:ln>
           <a:extLst>
             <a:ext uri="{C572A759-6A51-4108-AA02-DFA0A04FC94B}">
-              <ma14:wrappingTextBoxFlag xmlns="" xmlns:ma14="http://schemas.microsoft.com/office/mac/drawingml/2011/main" val="1"/>
+              <ma14:wrappingTextBoxFlag xmlns:ma14="http://schemas.microsoft.com/office/mac/drawingml/2011/main" xmlns="" val="1"/>
             </a:ext>
           </a:extLst>
         </p:spPr>
@@ -2850,7 +2849,7 @@
           </a:ln>
           <a:extLst>
             <a:ext uri="{C572A759-6A51-4108-AA02-DFA0A04FC94B}">
-              <ma14:wrappingTextBoxFlag xmlns="" xmlns:ma14="http://schemas.microsoft.com/office/mac/drawingml/2011/main" val="1"/>
+              <ma14:wrappingTextBoxFlag xmlns:ma14="http://schemas.microsoft.com/office/mac/drawingml/2011/main" xmlns="" val="1"/>
             </a:ext>
           </a:extLst>
         </p:spPr>
@@ -2920,7 +2919,7 @@
           </a:ln>
           <a:extLst>
             <a:ext uri="{C572A759-6A51-4108-AA02-DFA0A04FC94B}">
-              <ma14:wrappingTextBoxFlag xmlns="" xmlns:ma14="http://schemas.microsoft.com/office/mac/drawingml/2011/main" val="1"/>
+              <ma14:wrappingTextBoxFlag xmlns:ma14="http://schemas.microsoft.com/office/mac/drawingml/2011/main" xmlns="" val="1"/>
             </a:ext>
           </a:extLst>
         </p:spPr>
@@ -3002,7 +3001,7 @@
           </a:ln>
           <a:extLst>
             <a:ext uri="{C572A759-6A51-4108-AA02-DFA0A04FC94B}">
-              <ma14:wrappingTextBoxFlag xmlns="" xmlns:ma14="http://schemas.microsoft.com/office/mac/drawingml/2011/main" val="1"/>
+              <ma14:wrappingTextBoxFlag xmlns:ma14="http://schemas.microsoft.com/office/mac/drawingml/2011/main" xmlns="" val="1"/>
             </a:ext>
           </a:extLst>
         </p:spPr>
@@ -3157,7 +3156,7 @@
           </a:prstGeom>
           <a:extLst>
             <a:ext uri="{C572A759-6A51-4108-AA02-DFA0A04FC94B}">
-              <ma14:wrappingTextBoxFlag xmlns="" xmlns:ma14="http://schemas.microsoft.com/office/mac/drawingml/2011/main" val="1"/>
+              <ma14:wrappingTextBoxFlag xmlns:ma14="http://schemas.microsoft.com/office/mac/drawingml/2011/main" xmlns="" val="1"/>
             </a:ext>
           </a:extLst>
         </p:spPr>
@@ -3225,7 +3224,7 @@
           </a:ln>
           <a:extLst>
             <a:ext uri="{C572A759-6A51-4108-AA02-DFA0A04FC94B}">
-              <ma14:wrappingTextBoxFlag xmlns="" xmlns:ma14="http://schemas.microsoft.com/office/mac/drawingml/2011/main" val="1"/>
+              <ma14:wrappingTextBoxFlag xmlns:ma14="http://schemas.microsoft.com/office/mac/drawingml/2011/main" xmlns="" val="1"/>
             </a:ext>
           </a:extLst>
         </p:spPr>
@@ -3283,7 +3282,7 @@
           </a:ln>
           <a:extLst>
             <a:ext uri="{C572A759-6A51-4108-AA02-DFA0A04FC94B}">
-              <ma14:wrappingTextBoxFlag xmlns="" xmlns:ma14="http://schemas.microsoft.com/office/mac/drawingml/2011/main" val="1"/>
+              <ma14:wrappingTextBoxFlag xmlns:ma14="http://schemas.microsoft.com/office/mac/drawingml/2011/main" xmlns="" val="1"/>
             </a:ext>
           </a:extLst>
         </p:spPr>
@@ -3341,7 +3340,7 @@
           </a:ln>
           <a:extLst>
             <a:ext uri="{C572A759-6A51-4108-AA02-DFA0A04FC94B}">
-              <ma14:wrappingTextBoxFlag xmlns="" xmlns:ma14="http://schemas.microsoft.com/office/mac/drawingml/2011/main" val="1"/>
+              <ma14:wrappingTextBoxFlag xmlns:ma14="http://schemas.microsoft.com/office/mac/drawingml/2011/main" xmlns="" val="1"/>
             </a:ext>
           </a:extLst>
         </p:spPr>
@@ -3491,7 +3490,7 @@
           </a:ln>
           <a:extLst>
             <a:ext uri="{C572A759-6A51-4108-AA02-DFA0A04FC94B}">
-              <ma14:wrappingTextBoxFlag xmlns="" xmlns:ma14="http://schemas.microsoft.com/office/mac/drawingml/2011/main" val="1"/>
+              <ma14:wrappingTextBoxFlag xmlns:ma14="http://schemas.microsoft.com/office/mac/drawingml/2011/main" xmlns="" val="1"/>
             </a:ext>
           </a:extLst>
         </p:spPr>
@@ -3869,7 +3868,7 @@
           </a:ln>
           <a:extLst>
             <a:ext uri="{C572A759-6A51-4108-AA02-DFA0A04FC94B}">
-              <ma14:wrappingTextBoxFlag xmlns="" xmlns:ma14="http://schemas.microsoft.com/office/mac/drawingml/2011/main" val="1"/>
+              <ma14:wrappingTextBoxFlag xmlns:ma14="http://schemas.microsoft.com/office/mac/drawingml/2011/main" xmlns="" val="1"/>
             </a:ext>
           </a:extLst>
         </p:spPr>
@@ -3987,7 +3986,7 @@
                 <a:latin typeface="Calibri" panose="020F0502020204030204" pitchFamily="34" charset="0"/>
                 <a:cs typeface="Calibri" panose="020F0502020204030204" pitchFamily="34" charset="0"/>
               </a:rPr>
-              <a:t> di 15</a:t>
+              <a:t> di 14</a:t>
             </a:r>
           </a:p>
         </p:txBody>
@@ -4017,7 +4016,7 @@
           </a:ln>
           <a:extLst>
             <a:ext uri="{C572A759-6A51-4108-AA02-DFA0A04FC94B}">
-              <ma14:wrappingTextBoxFlag xmlns="" xmlns:ma14="http://schemas.microsoft.com/office/mac/drawingml/2011/main" val="1"/>
+              <ma14:wrappingTextBoxFlag xmlns:ma14="http://schemas.microsoft.com/office/mac/drawingml/2011/main" xmlns="" val="1"/>
             </a:ext>
           </a:extLst>
         </p:spPr>
@@ -4296,8 +4295,8 @@
         </p:blipFill>
         <p:spPr>
           <a:xfrm>
-            <a:off x="2805880" y="1899000"/>
-            <a:ext cx="6238366" cy="3060000"/>
+            <a:off x="2805880" y="1902591"/>
+            <a:ext cx="6238366" cy="3052817"/>
           </a:xfrm>
           <a:prstGeom prst="rect">
             <a:avLst/>
@@ -4382,7 +4381,7 @@
           </a:prstGeom>
           <a:extLst>
             <a:ext uri="{C572A759-6A51-4108-AA02-DFA0A04FC94B}">
-              <ma14:wrappingTextBoxFlag xmlns="" xmlns:ma14="http://schemas.microsoft.com/office/mac/drawingml/2011/main" val="1"/>
+              <ma14:wrappingTextBoxFlag xmlns:ma14="http://schemas.microsoft.com/office/mac/drawingml/2011/main" xmlns="" val="1"/>
             </a:ext>
           </a:extLst>
         </p:spPr>
@@ -4450,7 +4449,7 @@
           </a:ln>
           <a:extLst>
             <a:ext uri="{C572A759-6A51-4108-AA02-DFA0A04FC94B}">
-              <ma14:wrappingTextBoxFlag xmlns="" xmlns:ma14="http://schemas.microsoft.com/office/mac/drawingml/2011/main" val="1"/>
+              <ma14:wrappingTextBoxFlag xmlns:ma14="http://schemas.microsoft.com/office/mac/drawingml/2011/main" xmlns="" val="1"/>
             </a:ext>
           </a:extLst>
         </p:spPr>
@@ -4510,7 +4509,7 @@
           </a:ln>
           <a:extLst>
             <a:ext uri="{C572A759-6A51-4108-AA02-DFA0A04FC94B}">
-              <ma14:wrappingTextBoxFlag xmlns="" xmlns:ma14="http://schemas.microsoft.com/office/mac/drawingml/2011/main" val="1"/>
+              <ma14:wrappingTextBoxFlag xmlns:ma14="http://schemas.microsoft.com/office/mac/drawingml/2011/main" xmlns="" val="1"/>
             </a:ext>
           </a:extLst>
         </p:spPr>
@@ -4660,7 +4659,7 @@
           </a:ln>
           <a:extLst>
             <a:ext uri="{C572A759-6A51-4108-AA02-DFA0A04FC94B}">
-              <ma14:wrappingTextBoxFlag xmlns="" xmlns:ma14="http://schemas.microsoft.com/office/mac/drawingml/2011/main" val="1"/>
+              <ma14:wrappingTextBoxFlag xmlns:ma14="http://schemas.microsoft.com/office/mac/drawingml/2011/main" xmlns="" val="1"/>
             </a:ext>
           </a:extLst>
         </p:spPr>
@@ -5038,7 +5037,7 @@
           </a:ln>
           <a:extLst>
             <a:ext uri="{C572A759-6A51-4108-AA02-DFA0A04FC94B}">
-              <ma14:wrappingTextBoxFlag xmlns="" xmlns:ma14="http://schemas.microsoft.com/office/mac/drawingml/2011/main" val="1"/>
+              <ma14:wrappingTextBoxFlag xmlns:ma14="http://schemas.microsoft.com/office/mac/drawingml/2011/main" xmlns="" val="1"/>
             </a:ext>
           </a:extLst>
         </p:spPr>
@@ -5156,7 +5155,7 @@
                 <a:latin typeface="Calibri" panose="020F0502020204030204" pitchFamily="34" charset="0"/>
                 <a:cs typeface="Calibri" panose="020F0502020204030204" pitchFamily="34" charset="0"/>
               </a:rPr>
-              <a:t> di 15</a:t>
+              <a:t> di 14</a:t>
             </a:r>
           </a:p>
         </p:txBody>
@@ -6200,7 +6199,7 @@
           </a:prstGeom>
           <a:extLst>
             <a:ext uri="{C572A759-6A51-4108-AA02-DFA0A04FC94B}">
-              <ma14:wrappingTextBoxFlag xmlns="" xmlns:ma14="http://schemas.microsoft.com/office/mac/drawingml/2011/main" val="1"/>
+              <ma14:wrappingTextBoxFlag xmlns:ma14="http://schemas.microsoft.com/office/mac/drawingml/2011/main" xmlns="" val="1"/>
             </a:ext>
           </a:extLst>
         </p:spPr>
@@ -6268,7 +6267,7 @@
           </a:ln>
           <a:extLst>
             <a:ext uri="{C572A759-6A51-4108-AA02-DFA0A04FC94B}">
-              <ma14:wrappingTextBoxFlag xmlns="" xmlns:ma14="http://schemas.microsoft.com/office/mac/drawingml/2011/main" val="1"/>
+              <ma14:wrappingTextBoxFlag xmlns:ma14="http://schemas.microsoft.com/office/mac/drawingml/2011/main" xmlns="" val="1"/>
             </a:ext>
           </a:extLst>
         </p:spPr>
@@ -6326,7 +6325,7 @@
           </a:ln>
           <a:extLst>
             <a:ext uri="{C572A759-6A51-4108-AA02-DFA0A04FC94B}">
-              <ma14:wrappingTextBoxFlag xmlns="" xmlns:ma14="http://schemas.microsoft.com/office/mac/drawingml/2011/main" val="1"/>
+              <ma14:wrappingTextBoxFlag xmlns:ma14="http://schemas.microsoft.com/office/mac/drawingml/2011/main" xmlns="" val="1"/>
             </a:ext>
           </a:extLst>
         </p:spPr>
@@ -6384,7 +6383,7 @@
           </a:ln>
           <a:extLst>
             <a:ext uri="{C572A759-6A51-4108-AA02-DFA0A04FC94B}">
-              <ma14:wrappingTextBoxFlag xmlns="" xmlns:ma14="http://schemas.microsoft.com/office/mac/drawingml/2011/main" val="1"/>
+              <ma14:wrappingTextBoxFlag xmlns:ma14="http://schemas.microsoft.com/office/mac/drawingml/2011/main" xmlns="" val="1"/>
             </a:ext>
           </a:extLst>
         </p:spPr>
@@ -6534,7 +6533,7 @@
           </a:ln>
           <a:extLst>
             <a:ext uri="{C572A759-6A51-4108-AA02-DFA0A04FC94B}">
-              <ma14:wrappingTextBoxFlag xmlns="" xmlns:ma14="http://schemas.microsoft.com/office/mac/drawingml/2011/main" val="1"/>
+              <ma14:wrappingTextBoxFlag xmlns:ma14="http://schemas.microsoft.com/office/mac/drawingml/2011/main" xmlns="" val="1"/>
             </a:ext>
           </a:extLst>
         </p:spPr>
@@ -6912,7 +6911,7 @@
           </a:ln>
           <a:extLst>
             <a:ext uri="{C572A759-6A51-4108-AA02-DFA0A04FC94B}">
-              <ma14:wrappingTextBoxFlag xmlns="" xmlns:ma14="http://schemas.microsoft.com/office/mac/drawingml/2011/main" val="1"/>
+              <ma14:wrappingTextBoxFlag xmlns:ma14="http://schemas.microsoft.com/office/mac/drawingml/2011/main" xmlns="" val="1"/>
             </a:ext>
           </a:extLst>
         </p:spPr>
@@ -7030,7 +7029,7 @@
                 <a:latin typeface="Calibri" panose="020F0502020204030204" pitchFamily="34" charset="0"/>
                 <a:cs typeface="Calibri" panose="020F0502020204030204" pitchFamily="34" charset="0"/>
               </a:rPr>
-              <a:t> di 15</a:t>
+              <a:t> di 14</a:t>
             </a:r>
           </a:p>
         </p:txBody>
@@ -7277,7 +7276,7 @@
           </a:ln>
           <a:extLst>
             <a:ext uri="{C572A759-6A51-4108-AA02-DFA0A04FC94B}">
-              <ma14:wrappingTextBoxFlag xmlns="" xmlns:ma14="http://schemas.microsoft.com/office/mac/drawingml/2011/main" val="1"/>
+              <ma14:wrappingTextBoxFlag xmlns:ma14="http://schemas.microsoft.com/office/mac/drawingml/2011/main" xmlns="" val="1"/>
             </a:ext>
           </a:extLst>
         </p:spPr>
@@ -7546,7 +7545,7 @@
           </a:prstGeom>
           <a:extLst>
             <a:ext uri="{C572A759-6A51-4108-AA02-DFA0A04FC94B}">
-              <ma14:wrappingTextBoxFlag xmlns="" xmlns:ma14="http://schemas.microsoft.com/office/mac/drawingml/2011/main" val="1"/>
+              <ma14:wrappingTextBoxFlag xmlns:ma14="http://schemas.microsoft.com/office/mac/drawingml/2011/main" xmlns="" val="1"/>
             </a:ext>
           </a:extLst>
         </p:spPr>
@@ -7614,7 +7613,7 @@
           </a:ln>
           <a:extLst>
             <a:ext uri="{C572A759-6A51-4108-AA02-DFA0A04FC94B}">
-              <ma14:wrappingTextBoxFlag xmlns="" xmlns:ma14="http://schemas.microsoft.com/office/mac/drawingml/2011/main" val="1"/>
+              <ma14:wrappingTextBoxFlag xmlns:ma14="http://schemas.microsoft.com/office/mac/drawingml/2011/main" xmlns="" val="1"/>
             </a:ext>
           </a:extLst>
         </p:spPr>
@@ -7674,7 +7673,7 @@
           </a:ln>
           <a:extLst>
             <a:ext uri="{C572A759-6A51-4108-AA02-DFA0A04FC94B}">
-              <ma14:wrappingTextBoxFlag xmlns="" xmlns:ma14="http://schemas.microsoft.com/office/mac/drawingml/2011/main" val="1"/>
+              <ma14:wrappingTextBoxFlag xmlns:ma14="http://schemas.microsoft.com/office/mac/drawingml/2011/main" xmlns="" val="1"/>
             </a:ext>
           </a:extLst>
         </p:spPr>
@@ -7824,7 +7823,7 @@
           </a:ln>
           <a:extLst>
             <a:ext uri="{C572A759-6A51-4108-AA02-DFA0A04FC94B}">
-              <ma14:wrappingTextBoxFlag xmlns="" xmlns:ma14="http://schemas.microsoft.com/office/mac/drawingml/2011/main" val="1"/>
+              <ma14:wrappingTextBoxFlag xmlns:ma14="http://schemas.microsoft.com/office/mac/drawingml/2011/main" xmlns="" val="1"/>
             </a:ext>
           </a:extLst>
         </p:spPr>
@@ -8200,7 +8199,7 @@
           </a:ln>
           <a:extLst>
             <a:ext uri="{C572A759-6A51-4108-AA02-DFA0A04FC94B}">
-              <ma14:wrappingTextBoxFlag xmlns="" xmlns:ma14="http://schemas.microsoft.com/office/mac/drawingml/2011/main" val="1"/>
+              <ma14:wrappingTextBoxFlag xmlns:ma14="http://schemas.microsoft.com/office/mac/drawingml/2011/main" xmlns="" val="1"/>
             </a:ext>
           </a:extLst>
         </p:spPr>
@@ -8318,7 +8317,7 @@
                 <a:latin typeface="Calibri" panose="020F0502020204030204" pitchFamily="34" charset="0"/>
                 <a:cs typeface="Calibri" panose="020F0502020204030204" pitchFamily="34" charset="0"/>
               </a:rPr>
-              <a:t> di 15</a:t>
+              <a:t> di 14</a:t>
             </a:r>
           </a:p>
         </p:txBody>
@@ -9364,7 +9363,7 @@
           </a:prstGeom>
           <a:extLst>
             <a:ext uri="{C572A759-6A51-4108-AA02-DFA0A04FC94B}">
-              <ma14:wrappingTextBoxFlag xmlns="" xmlns:ma14="http://schemas.microsoft.com/office/mac/drawingml/2011/main" val="1"/>
+              <ma14:wrappingTextBoxFlag xmlns:ma14="http://schemas.microsoft.com/office/mac/drawingml/2011/main" xmlns="" val="1"/>
             </a:ext>
           </a:extLst>
         </p:spPr>
@@ -9432,7 +9431,7 @@
           </a:ln>
           <a:extLst>
             <a:ext uri="{C572A759-6A51-4108-AA02-DFA0A04FC94B}">
-              <ma14:wrappingTextBoxFlag xmlns="" xmlns:ma14="http://schemas.microsoft.com/office/mac/drawingml/2011/main" val="1"/>
+              <ma14:wrappingTextBoxFlag xmlns:ma14="http://schemas.microsoft.com/office/mac/drawingml/2011/main" xmlns="" val="1"/>
             </a:ext>
           </a:extLst>
         </p:spPr>
@@ -9492,7 +9491,7 @@
           </a:ln>
           <a:extLst>
             <a:ext uri="{C572A759-6A51-4108-AA02-DFA0A04FC94B}">
-              <ma14:wrappingTextBoxFlag xmlns="" xmlns:ma14="http://schemas.microsoft.com/office/mac/drawingml/2011/main" val="1"/>
+              <ma14:wrappingTextBoxFlag xmlns:ma14="http://schemas.microsoft.com/office/mac/drawingml/2011/main" xmlns="" val="1"/>
             </a:ext>
           </a:extLst>
         </p:spPr>
@@ -9642,7 +9641,7 @@
           </a:ln>
           <a:extLst>
             <a:ext uri="{C572A759-6A51-4108-AA02-DFA0A04FC94B}">
-              <ma14:wrappingTextBoxFlag xmlns="" xmlns:ma14="http://schemas.microsoft.com/office/mac/drawingml/2011/main" val="1"/>
+              <ma14:wrappingTextBoxFlag xmlns:ma14="http://schemas.microsoft.com/office/mac/drawingml/2011/main" xmlns="" val="1"/>
             </a:ext>
           </a:extLst>
         </p:spPr>
@@ -10018,7 +10017,7 @@
           </a:ln>
           <a:extLst>
             <a:ext uri="{C572A759-6A51-4108-AA02-DFA0A04FC94B}">
-              <ma14:wrappingTextBoxFlag xmlns="" xmlns:ma14="http://schemas.microsoft.com/office/mac/drawingml/2011/main" val="1"/>
+              <ma14:wrappingTextBoxFlag xmlns:ma14="http://schemas.microsoft.com/office/mac/drawingml/2011/main" xmlns="" val="1"/>
             </a:ext>
           </a:extLst>
         </p:spPr>
@@ -10136,7 +10135,7 @@
                 <a:latin typeface="Calibri" panose="020F0502020204030204" pitchFamily="34" charset="0"/>
                 <a:cs typeface="Calibri" panose="020F0502020204030204" pitchFamily="34" charset="0"/>
               </a:rPr>
-              <a:t> di 15</a:t>
+              <a:t> di 14</a:t>
             </a:r>
           </a:p>
         </p:txBody>
@@ -10166,7 +10165,7 @@
           </a:ln>
           <a:extLst>
             <a:ext uri="{C572A759-6A51-4108-AA02-DFA0A04FC94B}">
-              <ma14:wrappingTextBoxFlag xmlns="" xmlns:ma14="http://schemas.microsoft.com/office/mac/drawingml/2011/main" val="1"/>
+              <ma14:wrappingTextBoxFlag xmlns:ma14="http://schemas.microsoft.com/office/mac/drawingml/2011/main" xmlns="" val="1"/>
             </a:ext>
           </a:extLst>
         </p:spPr>
@@ -10222,7 +10221,7 @@
           </a:ln>
           <a:extLst>
             <a:ext uri="{C572A759-6A51-4108-AA02-DFA0A04FC94B}">
-              <ma14:wrappingTextBoxFlag xmlns="" xmlns:ma14="http://schemas.microsoft.com/office/mac/drawingml/2011/main" val="1"/>
+              <ma14:wrappingTextBoxFlag xmlns:ma14="http://schemas.microsoft.com/office/mac/drawingml/2011/main" xmlns="" val="1"/>
             </a:ext>
           </a:extLst>
         </p:spPr>
@@ -10329,267 +10328,6 @@
     <p:extLst>
       <p:ext uri="{BB962C8B-B14F-4D97-AF65-F5344CB8AC3E}">
         <p14:creationId xmlns:p14="http://schemas.microsoft.com/office/powerpoint/2010/main" val="2351126367"/>
-      </p:ext>
-    </p:extLst>
-  </p:cSld>
-  <p:clrMapOvr>
-    <a:masterClrMapping/>
-  </p:clrMapOvr>
-  <p:transition spd="med"/>
-</p:sld>
-</file>
-
-<file path=ppt/slides/slide15.xml><?xml version="1.0" encoding="utf-8"?>
-<p:sld xmlns:a="http://schemas.openxmlformats.org/drawingml/2006/main" xmlns:r="http://schemas.openxmlformats.org/officeDocument/2006/relationships" xmlns:p="http://schemas.openxmlformats.org/presentationml/2006/main">
-  <p:cSld>
-    <p:spTree>
-      <p:nvGrpSpPr>
-        <p:cNvPr id="1" name=""/>
-        <p:cNvGrpSpPr/>
-        <p:nvPr/>
-      </p:nvGrpSpPr>
-      <p:grpSpPr>
-        <a:xfrm>
-          <a:off x="0" y="0"/>
-          <a:ext cx="0" cy="0"/>
-          <a:chOff x="0" y="0"/>
-          <a:chExt cx="0" cy="0"/>
-        </a:xfrm>
-      </p:grpSpPr>
-      <p:sp>
-        <p:nvSpPr>
-          <p:cNvPr id="49" name="Shape 49"/>
-          <p:cNvSpPr/>
-          <p:nvPr/>
-        </p:nvSpPr>
-        <p:spPr>
-          <a:xfrm>
-            <a:off x="2133600" y="728980"/>
-            <a:ext cx="5207000" cy="1754326"/>
-          </a:xfrm>
-          <a:prstGeom prst="rect">
-            <a:avLst/>
-          </a:prstGeom>
-          <a:ln w="12700">
-            <a:miter lim="400000"/>
-          </a:ln>
-          <a:extLst>
-            <a:ext uri="{C572A759-6A51-4108-AA02-DFA0A04FC94B}">
-              <ma14:wrappingTextBoxFlag xmlns="" xmlns:ma14="http://schemas.microsoft.com/office/mac/drawingml/2011/main" val="1"/>
-            </a:ext>
-          </a:extLst>
-        </p:spPr>
-        <p:txBody>
-          <a:bodyPr lIns="45719" rIns="45719">
-            <a:spAutoFit/>
-          </a:bodyPr>
-          <a:lstStyle>
-            <a:lvl1pPr algn="ctr">
-              <a:defRPr sz="5400">
-                <a:solidFill>
-                  <a:srgbClr val="FFFFFF"/>
-                </a:solidFill>
-              </a:defRPr>
-            </a:lvl1pPr>
-          </a:lstStyle>
-          <a:p>
-            <a:pPr lvl="0">
-              <a:defRPr sz="1800">
-                <a:solidFill>
-                  <a:srgbClr val="000000"/>
-                </a:solidFill>
-              </a:defRPr>
-            </a:pPr>
-            <a:r>
-              <a:rPr sz="5400">
-                <a:solidFill>
-                  <a:srgbClr val="FFFFFF"/>
-                </a:solidFill>
-                <a:latin typeface="Calibri" panose="020F0502020204030204" pitchFamily="34" charset="0"/>
-                <a:cs typeface="Calibri" panose="020F0502020204030204" pitchFamily="34" charset="0"/>
-              </a:rPr>
-              <a:t>Node Replication Attack in WSN</a:t>
-            </a:r>
-          </a:p>
-        </p:txBody>
-      </p:sp>
-      <p:pic>
-        <p:nvPicPr>
-          <p:cNvPr id="50" name="image1.png"/>
-          <p:cNvPicPr/>
-          <p:nvPr/>
-        </p:nvPicPr>
-        <p:blipFill>
-          <a:blip r:embed="rId2">
-            <a:extLst/>
-          </a:blip>
-          <a:stretch>
-            <a:fillRect/>
-          </a:stretch>
-        </p:blipFill>
-        <p:spPr>
-          <a:xfrm>
-            <a:off x="-50800" y="-29855"/>
-            <a:ext cx="9245600" cy="5917550"/>
-          </a:xfrm>
-          <a:prstGeom prst="rect">
-            <a:avLst/>
-          </a:prstGeom>
-          <a:ln w="12700">
-            <a:miter lim="400000"/>
-          </a:ln>
-        </p:spPr>
-      </p:pic>
-      <p:pic>
-        <p:nvPicPr>
-          <p:cNvPr id="51" name="image2.png"/>
-          <p:cNvPicPr/>
-          <p:nvPr/>
-        </p:nvPicPr>
-        <p:blipFill>
-          <a:blip r:embed="rId3">
-            <a:extLst/>
-          </a:blip>
-          <a:stretch>
-            <a:fillRect/>
-          </a:stretch>
-        </p:blipFill>
-        <p:spPr>
-          <a:xfrm>
-            <a:off x="5918513" y="5328221"/>
-            <a:ext cx="2740335" cy="1229236"/>
-          </a:xfrm>
-          <a:prstGeom prst="rect">
-            <a:avLst/>
-          </a:prstGeom>
-          <a:ln w="12700">
-            <a:miter lim="400000"/>
-          </a:ln>
-        </p:spPr>
-      </p:pic>
-      <p:pic>
-        <p:nvPicPr>
-          <p:cNvPr id="14" name="dipmat.png">
-            <a:extLst>
-              <a:ext uri="{FF2B5EF4-FFF2-40B4-BE49-F238E27FC236}">
-                <a16:creationId xmlns:a16="http://schemas.microsoft.com/office/drawing/2014/main" id="{E17EB9CC-088F-4A42-A092-4DF249FF91D0}"/>
-              </a:ext>
-            </a:extLst>
-          </p:cNvPr>
-          <p:cNvPicPr/>
-          <p:nvPr/>
-        </p:nvPicPr>
-        <p:blipFill>
-          <a:blip r:embed="rId4" cstate="print">
-            <a:extLst>
-              <a:ext uri="{28A0092B-C50C-407E-A947-70E740481C1C}">
-                <a14:useLocalDpi xmlns:a14="http://schemas.microsoft.com/office/drawing/2010/main" val="0"/>
-              </a:ext>
-            </a:extLst>
-          </a:blip>
-          <a:stretch>
-            <a:fillRect/>
-          </a:stretch>
-        </p:blipFill>
-        <p:spPr>
-          <a:xfrm>
-            <a:off x="226953" y="6128896"/>
-            <a:ext cx="2997201" cy="455574"/>
-          </a:xfrm>
-          <a:prstGeom prst="rect">
-            <a:avLst/>
-          </a:prstGeom>
-          <a:ln w="12700">
-            <a:miter lim="400000"/>
-          </a:ln>
-        </p:spPr>
-      </p:pic>
-      <p:sp>
-        <p:nvSpPr>
-          <p:cNvPr id="13" name="Shape 52">
-            <a:extLst>
-              <a:ext uri="{FF2B5EF4-FFF2-40B4-BE49-F238E27FC236}">
-                <a16:creationId xmlns:a16="http://schemas.microsoft.com/office/drawing/2014/main" id="{A5A37ACF-F14F-46B9-BF02-EF9EA484C756}"/>
-              </a:ext>
-            </a:extLst>
-          </p:cNvPr>
-          <p:cNvSpPr/>
-          <p:nvPr/>
-        </p:nvSpPr>
-        <p:spPr>
-          <a:xfrm>
-            <a:off x="1282895" y="1679687"/>
-            <a:ext cx="6578209" cy="1938992"/>
-          </a:xfrm>
-          <a:prstGeom prst="rect">
-            <a:avLst/>
-          </a:prstGeom>
-          <a:ln w="12700">
-            <a:miter lim="400000"/>
-          </a:ln>
-          <a:extLst>
-            <a:ext uri="{C572A759-6A51-4108-AA02-DFA0A04FC94B}">
-              <ma14:wrappingTextBoxFlag xmlns="" xmlns:ma14="http://schemas.microsoft.com/office/mac/drawingml/2011/main" val="1"/>
-            </a:ext>
-          </a:extLst>
-        </p:spPr>
-        <p:txBody>
-          <a:bodyPr wrap="square" lIns="45719" rIns="45719">
-            <a:spAutoFit/>
-          </a:bodyPr>
-          <a:lstStyle/>
-          <a:p>
-            <a:pPr lvl="0" algn="ctr"/>
-            <a:r>
-              <a:rPr lang="it-IT" sz="4000" b="1" dirty="0">
-                <a:solidFill>
-                  <a:schemeClr val="bg1"/>
-                </a:solidFill>
-                <a:latin typeface="Calibri" panose="020F0502020204030204" pitchFamily="34" charset="0"/>
-                <a:cs typeface="Calibri" panose="020F0502020204030204" pitchFamily="34" charset="0"/>
-              </a:rPr>
-              <a:t>GRAZIE</a:t>
-            </a:r>
-          </a:p>
-          <a:p>
-            <a:pPr lvl="0" algn="ctr"/>
-            <a:r>
-              <a:rPr lang="it-IT" sz="4000" b="1" dirty="0">
-                <a:solidFill>
-                  <a:schemeClr val="bg1"/>
-                </a:solidFill>
-                <a:latin typeface="Calibri" panose="020F0502020204030204" pitchFamily="34" charset="0"/>
-                <a:cs typeface="Calibri" panose="020F0502020204030204" pitchFamily="34" charset="0"/>
-              </a:rPr>
-              <a:t>PER</a:t>
-            </a:r>
-          </a:p>
-          <a:p>
-            <a:pPr lvl="0" algn="ctr"/>
-            <a:r>
-              <a:rPr lang="it-IT" sz="4000" b="1" dirty="0">
-                <a:solidFill>
-                  <a:schemeClr val="bg1"/>
-                </a:solidFill>
-                <a:latin typeface="Calibri" panose="020F0502020204030204" pitchFamily="34" charset="0"/>
-                <a:cs typeface="Calibri" panose="020F0502020204030204" pitchFamily="34" charset="0"/>
-              </a:rPr>
-              <a:t>L’ATTENZIONE!</a:t>
-            </a:r>
-            <a:endParaRPr sz="4000" b="1" dirty="0">
-              <a:solidFill>
-                <a:schemeClr val="bg1"/>
-              </a:solidFill>
-              <a:latin typeface="Calibri" panose="020F0502020204030204" pitchFamily="34" charset="0"/>
-              <a:cs typeface="Calibri" panose="020F0502020204030204" pitchFamily="34" charset="0"/>
-            </a:endParaRPr>
-          </a:p>
-        </p:txBody>
-      </p:sp>
-    </p:spTree>
-    <p:extLst>
-      <p:ext uri="{BB962C8B-B14F-4D97-AF65-F5344CB8AC3E}">
-        <p14:creationId xmlns:p14="http://schemas.microsoft.com/office/powerpoint/2010/main" val="1646802030"/>
       </p:ext>
     </p:extLst>
   </p:cSld>
@@ -10664,7 +10402,7 @@
           </a:prstGeom>
           <a:extLst>
             <a:ext uri="{C572A759-6A51-4108-AA02-DFA0A04FC94B}">
-              <ma14:wrappingTextBoxFlag xmlns="" xmlns:ma14="http://schemas.microsoft.com/office/mac/drawingml/2011/main" val="1"/>
+              <ma14:wrappingTextBoxFlag xmlns:ma14="http://schemas.microsoft.com/office/mac/drawingml/2011/main" xmlns="" val="1"/>
             </a:ext>
           </a:extLst>
         </p:spPr>
@@ -10732,7 +10470,7 @@
           </a:ln>
           <a:extLst>
             <a:ext uri="{C572A759-6A51-4108-AA02-DFA0A04FC94B}">
-              <ma14:wrappingTextBoxFlag xmlns="" xmlns:ma14="http://schemas.microsoft.com/office/mac/drawingml/2011/main" val="1"/>
+              <ma14:wrappingTextBoxFlag xmlns:ma14="http://schemas.microsoft.com/office/mac/drawingml/2011/main" xmlns="" val="1"/>
             </a:ext>
           </a:extLst>
         </p:spPr>
@@ -10790,7 +10528,7 @@
           </a:ln>
           <a:extLst>
             <a:ext uri="{C572A759-6A51-4108-AA02-DFA0A04FC94B}">
-              <ma14:wrappingTextBoxFlag xmlns="" xmlns:ma14="http://schemas.microsoft.com/office/mac/drawingml/2011/main" val="1"/>
+              <ma14:wrappingTextBoxFlag xmlns:ma14="http://schemas.microsoft.com/office/mac/drawingml/2011/main" xmlns="" val="1"/>
             </a:ext>
           </a:extLst>
         </p:spPr>
@@ -10920,7 +10658,7 @@
           </a:ln>
           <a:extLst>
             <a:ext uri="{C572A759-6A51-4108-AA02-DFA0A04FC94B}">
-              <ma14:wrappingTextBoxFlag xmlns="" xmlns:ma14="http://schemas.microsoft.com/office/mac/drawingml/2011/main" val="1"/>
+              <ma14:wrappingTextBoxFlag xmlns:ma14="http://schemas.microsoft.com/office/mac/drawingml/2011/main" xmlns="" val="1"/>
             </a:ext>
           </a:extLst>
         </p:spPr>
@@ -11233,7 +10971,7 @@
           </a:ln>
           <a:extLst>
             <a:ext uri="{C572A759-6A51-4108-AA02-DFA0A04FC94B}">
-              <ma14:wrappingTextBoxFlag xmlns="" xmlns:ma14="http://schemas.microsoft.com/office/mac/drawingml/2011/main" val="1"/>
+              <ma14:wrappingTextBoxFlag xmlns:ma14="http://schemas.microsoft.com/office/mac/drawingml/2011/main" xmlns="" val="1"/>
             </a:ext>
           </a:extLst>
         </p:spPr>
@@ -11361,7 +11099,7 @@
                 <a:latin typeface="Calibri" panose="020F0502020204030204" pitchFamily="34" charset="0"/>
                 <a:cs typeface="Calibri" panose="020F0502020204030204" pitchFamily="34" charset="0"/>
               </a:rPr>
-              <a:t> di 15</a:t>
+              <a:t> di 14</a:t>
             </a:r>
           </a:p>
         </p:txBody>
@@ -11471,7 +11209,7 @@
           </a:prstGeom>
           <a:extLst>
             <a:ext uri="{C572A759-6A51-4108-AA02-DFA0A04FC94B}">
-              <ma14:wrappingTextBoxFlag xmlns="" xmlns:ma14="http://schemas.microsoft.com/office/mac/drawingml/2011/main" val="1"/>
+              <ma14:wrappingTextBoxFlag xmlns:ma14="http://schemas.microsoft.com/office/mac/drawingml/2011/main" xmlns="" val="1"/>
             </a:ext>
           </a:extLst>
         </p:spPr>
@@ -11539,7 +11277,7 @@
           </a:ln>
           <a:extLst>
             <a:ext uri="{C572A759-6A51-4108-AA02-DFA0A04FC94B}">
-              <ma14:wrappingTextBoxFlag xmlns="" xmlns:ma14="http://schemas.microsoft.com/office/mac/drawingml/2011/main" val="1"/>
+              <ma14:wrappingTextBoxFlag xmlns:ma14="http://schemas.microsoft.com/office/mac/drawingml/2011/main" xmlns="" val="1"/>
             </a:ext>
           </a:extLst>
         </p:spPr>
@@ -11599,7 +11337,7 @@
           </a:ln>
           <a:extLst>
             <a:ext uri="{C572A759-6A51-4108-AA02-DFA0A04FC94B}">
-              <ma14:wrappingTextBoxFlag xmlns="" xmlns:ma14="http://schemas.microsoft.com/office/mac/drawingml/2011/main" val="1"/>
+              <ma14:wrappingTextBoxFlag xmlns:ma14="http://schemas.microsoft.com/office/mac/drawingml/2011/main" xmlns="" val="1"/>
             </a:ext>
           </a:extLst>
         </p:spPr>
@@ -11974,7 +11712,7 @@
           </a:ln>
           <a:extLst>
             <a:ext uri="{C572A759-6A51-4108-AA02-DFA0A04FC94B}">
-              <ma14:wrappingTextBoxFlag xmlns="" xmlns:ma14="http://schemas.microsoft.com/office/mac/drawingml/2011/main" val="1"/>
+              <ma14:wrappingTextBoxFlag xmlns:ma14="http://schemas.microsoft.com/office/mac/drawingml/2011/main" xmlns="" val="1"/>
             </a:ext>
           </a:extLst>
         </p:spPr>
@@ -12102,7 +11840,7 @@
                 <a:latin typeface="Calibri" panose="020F0502020204030204" pitchFamily="34" charset="0"/>
                 <a:cs typeface="Calibri" panose="020F0502020204030204" pitchFamily="34" charset="0"/>
               </a:rPr>
-              <a:t> di 15</a:t>
+              <a:t> di 14</a:t>
             </a:r>
           </a:p>
         </p:txBody>
@@ -12320,7 +12058,7 @@
           </a:prstGeom>
           <a:extLst>
             <a:ext uri="{C572A759-6A51-4108-AA02-DFA0A04FC94B}">
-              <ma14:wrappingTextBoxFlag xmlns="" xmlns:ma14="http://schemas.microsoft.com/office/mac/drawingml/2011/main" val="1"/>
+              <ma14:wrappingTextBoxFlag xmlns:ma14="http://schemas.microsoft.com/office/mac/drawingml/2011/main" xmlns="" val="1"/>
             </a:ext>
           </a:extLst>
         </p:spPr>
@@ -12388,7 +12126,7 @@
           </a:ln>
           <a:extLst>
             <a:ext uri="{C572A759-6A51-4108-AA02-DFA0A04FC94B}">
-              <ma14:wrappingTextBoxFlag xmlns="" xmlns:ma14="http://schemas.microsoft.com/office/mac/drawingml/2011/main" val="1"/>
+              <ma14:wrappingTextBoxFlag xmlns:ma14="http://schemas.microsoft.com/office/mac/drawingml/2011/main" xmlns="" val="1"/>
             </a:ext>
           </a:extLst>
         </p:spPr>
@@ -12482,7 +12220,7 @@
           </a:ln>
           <a:extLst>
             <a:ext uri="{C572A759-6A51-4108-AA02-DFA0A04FC94B}">
-              <ma14:wrappingTextBoxFlag xmlns="" xmlns:ma14="http://schemas.microsoft.com/office/mac/drawingml/2011/main" val="1"/>
+              <ma14:wrappingTextBoxFlag xmlns:ma14="http://schemas.microsoft.com/office/mac/drawingml/2011/main" xmlns="" val="1"/>
             </a:ext>
           </a:extLst>
         </p:spPr>
@@ -12790,7 +12528,7 @@
           </a:ln>
           <a:extLst>
             <a:ext uri="{C572A759-6A51-4108-AA02-DFA0A04FC94B}">
-              <ma14:wrappingTextBoxFlag xmlns="" xmlns:ma14="http://schemas.microsoft.com/office/mac/drawingml/2011/main" val="1"/>
+              <ma14:wrappingTextBoxFlag xmlns:ma14="http://schemas.microsoft.com/office/mac/drawingml/2011/main" xmlns="" val="1"/>
             </a:ext>
           </a:extLst>
         </p:spPr>
@@ -13165,7 +12903,7 @@
           </a:ln>
           <a:extLst>
             <a:ext uri="{C572A759-6A51-4108-AA02-DFA0A04FC94B}">
-              <ma14:wrappingTextBoxFlag xmlns="" xmlns:ma14="http://schemas.microsoft.com/office/mac/drawingml/2011/main" val="1"/>
+              <ma14:wrappingTextBoxFlag xmlns:ma14="http://schemas.microsoft.com/office/mac/drawingml/2011/main" xmlns="" val="1"/>
             </a:ext>
           </a:extLst>
         </p:spPr>
@@ -13293,7 +13031,7 @@
                 <a:latin typeface="Calibri" panose="020F0502020204030204" pitchFamily="34" charset="0"/>
                 <a:cs typeface="Calibri" panose="020F0502020204030204" pitchFamily="34" charset="0"/>
               </a:rPr>
-              <a:t> di 15</a:t>
+              <a:t> di 14</a:t>
             </a:r>
           </a:p>
         </p:txBody>
@@ -13403,7 +13141,7 @@
           </a:prstGeom>
           <a:extLst>
             <a:ext uri="{C572A759-6A51-4108-AA02-DFA0A04FC94B}">
-              <ma14:wrappingTextBoxFlag xmlns="" xmlns:ma14="http://schemas.microsoft.com/office/mac/drawingml/2011/main" val="1"/>
+              <ma14:wrappingTextBoxFlag xmlns:ma14="http://schemas.microsoft.com/office/mac/drawingml/2011/main" xmlns="" val="1"/>
             </a:ext>
           </a:extLst>
         </p:spPr>
@@ -13471,7 +13209,7 @@
           </a:ln>
           <a:extLst>
             <a:ext uri="{C572A759-6A51-4108-AA02-DFA0A04FC94B}">
-              <ma14:wrappingTextBoxFlag xmlns="" xmlns:ma14="http://schemas.microsoft.com/office/mac/drawingml/2011/main" val="1"/>
+              <ma14:wrappingTextBoxFlag xmlns:ma14="http://schemas.microsoft.com/office/mac/drawingml/2011/main" xmlns="" val="1"/>
             </a:ext>
           </a:extLst>
         </p:spPr>
@@ -13504,52 +13242,6 @@
           </a:p>
         </p:txBody>
       </p:sp>
-      <p:pic>
-        <p:nvPicPr>
-          <p:cNvPr id="3" name="Immagine 2">
-            <a:extLst>
-              <a:ext uri="{FF2B5EF4-FFF2-40B4-BE49-F238E27FC236}">
-                <a16:creationId xmlns:a16="http://schemas.microsoft.com/office/drawing/2014/main" id="{3C84FFE4-A722-4AB7-A529-346C99D6FC97}"/>
-              </a:ext>
-            </a:extLst>
-          </p:cNvPr>
-          <p:cNvPicPr>
-            <a:picLocks noChangeAspect="1"/>
-          </p:cNvPicPr>
-          <p:nvPr/>
-        </p:nvPicPr>
-        <p:blipFill>
-          <a:blip r:embed="rId4">
-            <a:extLst>
-              <a:ext uri="{28A0092B-C50C-407E-A947-70E740481C1C}">
-                <a14:useLocalDpi xmlns:a14="http://schemas.microsoft.com/office/drawing/2010/main" val="0"/>
-              </a:ext>
-            </a:extLst>
-          </a:blip>
-          <a:stretch>
-            <a:fillRect/>
-          </a:stretch>
-        </p:blipFill>
-        <p:spPr>
-          <a:xfrm>
-            <a:off x="2411730" y="3147604"/>
-            <a:ext cx="4320540" cy="1377563"/>
-          </a:xfrm>
-          <a:prstGeom prst="rect">
-            <a:avLst/>
-          </a:prstGeom>
-          <a:ln>
-            <a:noFill/>
-          </a:ln>
-          <a:effectLst>
-            <a:outerShdw blurRad="292100" dist="139700" dir="2700000" algn="tl" rotWithShape="0">
-              <a:srgbClr val="333333">
-                <a:alpha val="65000"/>
-              </a:srgbClr>
-            </a:outerShdw>
-          </a:effectLst>
-        </p:spPr>
-      </p:pic>
       <p:sp>
         <p:nvSpPr>
           <p:cNvPr id="13" name="Shape 52">
@@ -13564,7 +13256,7 @@
         </p:nvSpPr>
         <p:spPr>
           <a:xfrm>
-            <a:off x="1068264" y="1968278"/>
+            <a:off x="1068264" y="828000"/>
             <a:ext cx="7007472" cy="1077218"/>
           </a:xfrm>
           <a:prstGeom prst="rect">
@@ -13575,7 +13267,7 @@
           </a:ln>
           <a:extLst>
             <a:ext uri="{C572A759-6A51-4108-AA02-DFA0A04FC94B}">
-              <ma14:wrappingTextBoxFlag xmlns="" xmlns:ma14="http://schemas.microsoft.com/office/mac/drawingml/2011/main" val="1"/>
+              <ma14:wrappingTextBoxFlag xmlns:ma14="http://schemas.microsoft.com/office/mac/drawingml/2011/main" xmlns="" val="1"/>
             </a:ext>
           </a:extLst>
         </p:spPr>
@@ -13673,7 +13365,7 @@
           </a:ln>
           <a:extLst>
             <a:ext uri="{C572A759-6A51-4108-AA02-DFA0A04FC94B}">
-              <ma14:wrappingTextBoxFlag xmlns="" xmlns:ma14="http://schemas.microsoft.com/office/mac/drawingml/2011/main" val="1"/>
+              <ma14:wrappingTextBoxFlag xmlns:ma14="http://schemas.microsoft.com/office/mac/drawingml/2011/main" xmlns="" val="1"/>
             </a:ext>
           </a:extLst>
         </p:spPr>
@@ -13823,7 +13515,7 @@
           </a:ln>
           <a:extLst>
             <a:ext uri="{C572A759-6A51-4108-AA02-DFA0A04FC94B}">
-              <ma14:wrappingTextBoxFlag xmlns="" xmlns:ma14="http://schemas.microsoft.com/office/mac/drawingml/2011/main" val="1"/>
+              <ma14:wrappingTextBoxFlag xmlns:ma14="http://schemas.microsoft.com/office/mac/drawingml/2011/main" xmlns="" val="1"/>
             </a:ext>
           </a:extLst>
         </p:spPr>
@@ -14090,7 +13782,7 @@
           </a:ln>
           <a:extLst>
             <a:ext uri="{C572A759-6A51-4108-AA02-DFA0A04FC94B}">
-              <ma14:wrappingTextBoxFlag xmlns="" xmlns:ma14="http://schemas.microsoft.com/office/mac/drawingml/2011/main" val="1"/>
+              <ma14:wrappingTextBoxFlag xmlns:ma14="http://schemas.microsoft.com/office/mac/drawingml/2011/main" xmlns="" val="1"/>
             </a:ext>
           </a:extLst>
         </p:spPr>
@@ -14351,7 +14043,7 @@
           </a:ln>
           <a:extLst>
             <a:ext uri="{C572A759-6A51-4108-AA02-DFA0A04FC94B}">
-              <ma14:wrappingTextBoxFlag xmlns="" xmlns:ma14="http://schemas.microsoft.com/office/mac/drawingml/2011/main" val="1"/>
+              <ma14:wrappingTextBoxFlag xmlns:ma14="http://schemas.microsoft.com/office/mac/drawingml/2011/main" xmlns="" val="1"/>
             </a:ext>
           </a:extLst>
         </p:spPr>
@@ -14479,11 +14171,47 @@
                 <a:latin typeface="Calibri" panose="020F0502020204030204" pitchFamily="34" charset="0"/>
                 <a:cs typeface="Calibri" panose="020F0502020204030204" pitchFamily="34" charset="0"/>
               </a:rPr>
-              <a:t> di 15</a:t>
+              <a:t> di 14</a:t>
             </a:r>
           </a:p>
         </p:txBody>
       </p:sp>
+      <p:pic>
+        <p:nvPicPr>
+          <p:cNvPr id="17" name="Immagine 16">
+            <a:extLst>
+              <a:ext uri="{FF2B5EF4-FFF2-40B4-BE49-F238E27FC236}">
+                <a16:creationId xmlns:a16="http://schemas.microsoft.com/office/drawing/2014/main" id="{823A22F2-691F-4B37-B2BA-B506D99DF4F8}"/>
+              </a:ext>
+            </a:extLst>
+          </p:cNvPr>
+          <p:cNvPicPr>
+            <a:picLocks noChangeAspect="1"/>
+          </p:cNvPicPr>
+          <p:nvPr/>
+        </p:nvPicPr>
+        <p:blipFill>
+          <a:blip r:embed="rId4">
+            <a:extLst>
+              <a:ext uri="{28A0092B-C50C-407E-A947-70E740481C1C}">
+                <a14:useLocalDpi xmlns:a14="http://schemas.microsoft.com/office/drawing/2010/main" val="0"/>
+              </a:ext>
+            </a:extLst>
+          </a:blip>
+          <a:stretch>
+            <a:fillRect/>
+          </a:stretch>
+        </p:blipFill>
+        <p:spPr>
+          <a:xfrm>
+            <a:off x="718887" y="1539000"/>
+            <a:ext cx="7706226" cy="3780000"/>
+          </a:xfrm>
+          <a:prstGeom prst="rect">
+            <a:avLst/>
+          </a:prstGeom>
+        </p:spPr>
+      </p:pic>
     </p:spTree>
     <p:extLst>
       <p:ext uri="{BB962C8B-B14F-4D97-AF65-F5344CB8AC3E}">
@@ -14589,7 +14317,7 @@
           </a:prstGeom>
           <a:extLst>
             <a:ext uri="{C572A759-6A51-4108-AA02-DFA0A04FC94B}">
-              <ma14:wrappingTextBoxFlag xmlns="" xmlns:ma14="http://schemas.microsoft.com/office/mac/drawingml/2011/main" val="1"/>
+              <ma14:wrappingTextBoxFlag xmlns:ma14="http://schemas.microsoft.com/office/mac/drawingml/2011/main" xmlns="" val="1"/>
             </a:ext>
           </a:extLst>
         </p:spPr>
@@ -14657,7 +14385,7 @@
           </a:ln>
           <a:extLst>
             <a:ext uri="{C572A759-6A51-4108-AA02-DFA0A04FC94B}">
-              <ma14:wrappingTextBoxFlag xmlns="" xmlns:ma14="http://schemas.microsoft.com/office/mac/drawingml/2011/main" val="1"/>
+              <ma14:wrappingTextBoxFlag xmlns:ma14="http://schemas.microsoft.com/office/mac/drawingml/2011/main" xmlns="" val="1"/>
             </a:ext>
           </a:extLst>
         </p:spPr>
@@ -14717,7 +14445,7 @@
           </a:ln>
           <a:extLst>
             <a:ext uri="{C572A759-6A51-4108-AA02-DFA0A04FC94B}">
-              <ma14:wrappingTextBoxFlag xmlns="" xmlns:ma14="http://schemas.microsoft.com/office/mac/drawingml/2011/main" val="1"/>
+              <ma14:wrappingTextBoxFlag xmlns:ma14="http://schemas.microsoft.com/office/mac/drawingml/2011/main" xmlns="" val="1"/>
             </a:ext>
           </a:extLst>
         </p:spPr>
@@ -14867,7 +14595,7 @@
           </a:ln>
           <a:extLst>
             <a:ext uri="{C572A759-6A51-4108-AA02-DFA0A04FC94B}">
-              <ma14:wrappingTextBoxFlag xmlns="" xmlns:ma14="http://schemas.microsoft.com/office/mac/drawingml/2011/main" val="1"/>
+              <ma14:wrappingTextBoxFlag xmlns:ma14="http://schemas.microsoft.com/office/mac/drawingml/2011/main" xmlns="" val="1"/>
             </a:ext>
           </a:extLst>
         </p:spPr>
@@ -15134,7 +14862,7 @@
           </a:ln>
           <a:extLst>
             <a:ext uri="{C572A759-6A51-4108-AA02-DFA0A04FC94B}">
-              <ma14:wrappingTextBoxFlag xmlns="" xmlns:ma14="http://schemas.microsoft.com/office/mac/drawingml/2011/main" val="1"/>
+              <ma14:wrappingTextBoxFlag xmlns:ma14="http://schemas.microsoft.com/office/mac/drawingml/2011/main" xmlns="" val="1"/>
             </a:ext>
           </a:extLst>
         </p:spPr>
@@ -15395,7 +15123,7 @@
           </a:ln>
           <a:extLst>
             <a:ext uri="{C572A759-6A51-4108-AA02-DFA0A04FC94B}">
-              <ma14:wrappingTextBoxFlag xmlns="" xmlns:ma14="http://schemas.microsoft.com/office/mac/drawingml/2011/main" val="1"/>
+              <ma14:wrappingTextBoxFlag xmlns:ma14="http://schemas.microsoft.com/office/mac/drawingml/2011/main" xmlns="" val="1"/>
             </a:ext>
           </a:extLst>
         </p:spPr>
@@ -15523,7 +15251,7 @@
                 <a:latin typeface="Calibri" panose="020F0502020204030204" pitchFamily="34" charset="0"/>
                 <a:cs typeface="Calibri" panose="020F0502020204030204" pitchFamily="34" charset="0"/>
               </a:rPr>
-              <a:t> di 15</a:t>
+              <a:t> di 14</a:t>
             </a:r>
           </a:p>
         </p:txBody>
@@ -15589,7 +15317,7 @@
           </a:ln>
           <a:extLst>
             <a:ext uri="{C572A759-6A51-4108-AA02-DFA0A04FC94B}">
-              <ma14:wrappingTextBoxFlag xmlns="" xmlns:ma14="http://schemas.microsoft.com/office/mac/drawingml/2011/main" val="1"/>
+              <ma14:wrappingTextBoxFlag xmlns:ma14="http://schemas.microsoft.com/office/mac/drawingml/2011/main" xmlns="" val="1"/>
             </a:ext>
           </a:extLst>
         </p:spPr>
@@ -15725,7 +15453,7 @@
           </a:prstGeom>
           <a:extLst>
             <a:ext uri="{C572A759-6A51-4108-AA02-DFA0A04FC94B}">
-              <ma14:wrappingTextBoxFlag xmlns="" xmlns:ma14="http://schemas.microsoft.com/office/mac/drawingml/2011/main" val="1"/>
+              <ma14:wrappingTextBoxFlag xmlns:ma14="http://schemas.microsoft.com/office/mac/drawingml/2011/main" xmlns="" val="1"/>
             </a:ext>
           </a:extLst>
         </p:spPr>
@@ -15793,7 +15521,7 @@
           </a:ln>
           <a:extLst>
             <a:ext uri="{C572A759-6A51-4108-AA02-DFA0A04FC94B}">
-              <ma14:wrappingTextBoxFlag xmlns="" xmlns:ma14="http://schemas.microsoft.com/office/mac/drawingml/2011/main" val="1"/>
+              <ma14:wrappingTextBoxFlag xmlns:ma14="http://schemas.microsoft.com/office/mac/drawingml/2011/main" xmlns="" val="1"/>
             </a:ext>
           </a:extLst>
         </p:spPr>
@@ -15851,7 +15579,7 @@
           </a:ln>
           <a:extLst>
             <a:ext uri="{C572A759-6A51-4108-AA02-DFA0A04FC94B}">
-              <ma14:wrappingTextBoxFlag xmlns="" xmlns:ma14="http://schemas.microsoft.com/office/mac/drawingml/2011/main" val="1"/>
+              <ma14:wrappingTextBoxFlag xmlns:ma14="http://schemas.microsoft.com/office/mac/drawingml/2011/main" xmlns="" val="1"/>
             </a:ext>
           </a:extLst>
         </p:spPr>
@@ -16021,7 +15749,7 @@
           </a:ln>
           <a:extLst>
             <a:ext uri="{C572A759-6A51-4108-AA02-DFA0A04FC94B}">
-              <ma14:wrappingTextBoxFlag xmlns="" xmlns:ma14="http://schemas.microsoft.com/office/mac/drawingml/2011/main" val="1"/>
+              <ma14:wrappingTextBoxFlag xmlns:ma14="http://schemas.microsoft.com/office/mac/drawingml/2011/main" xmlns="" val="1"/>
             </a:ext>
           </a:extLst>
         </p:spPr>
@@ -16171,7 +15899,7 @@
           </a:ln>
           <a:extLst>
             <a:ext uri="{C572A759-6A51-4108-AA02-DFA0A04FC94B}">
-              <ma14:wrappingTextBoxFlag xmlns="" xmlns:ma14="http://schemas.microsoft.com/office/mac/drawingml/2011/main" val="1"/>
+              <ma14:wrappingTextBoxFlag xmlns:ma14="http://schemas.microsoft.com/office/mac/drawingml/2011/main" xmlns="" val="1"/>
             </a:ext>
           </a:extLst>
         </p:spPr>
@@ -16549,7 +16277,7 @@
           </a:ln>
           <a:extLst>
             <a:ext uri="{C572A759-6A51-4108-AA02-DFA0A04FC94B}">
-              <ma14:wrappingTextBoxFlag xmlns="" xmlns:ma14="http://schemas.microsoft.com/office/mac/drawingml/2011/main" val="1"/>
+              <ma14:wrappingTextBoxFlag xmlns:ma14="http://schemas.microsoft.com/office/mac/drawingml/2011/main" xmlns="" val="1"/>
             </a:ext>
           </a:extLst>
         </p:spPr>
@@ -16677,7 +16405,7 @@
                 <a:latin typeface="Calibri" panose="020F0502020204030204" pitchFamily="34" charset="0"/>
                 <a:cs typeface="Calibri" panose="020F0502020204030204" pitchFamily="34" charset="0"/>
               </a:rPr>
-              <a:t> di 15</a:t>
+              <a:t> di 14</a:t>
             </a:r>
           </a:p>
         </p:txBody>
@@ -17053,7 +16781,7 @@
           </a:prstGeom>
           <a:extLst>
             <a:ext uri="{C572A759-6A51-4108-AA02-DFA0A04FC94B}">
-              <ma14:wrappingTextBoxFlag xmlns="" xmlns:ma14="http://schemas.microsoft.com/office/mac/drawingml/2011/main" val="1"/>
+              <ma14:wrappingTextBoxFlag xmlns:ma14="http://schemas.microsoft.com/office/mac/drawingml/2011/main" xmlns="" val="1"/>
             </a:ext>
           </a:extLst>
         </p:spPr>
@@ -17121,7 +16849,7 @@
           </a:ln>
           <a:extLst>
             <a:ext uri="{C572A759-6A51-4108-AA02-DFA0A04FC94B}">
-              <ma14:wrappingTextBoxFlag xmlns="" xmlns:ma14="http://schemas.microsoft.com/office/mac/drawingml/2011/main" val="1"/>
+              <ma14:wrappingTextBoxFlag xmlns:ma14="http://schemas.microsoft.com/office/mac/drawingml/2011/main" xmlns="" val="1"/>
             </a:ext>
           </a:extLst>
         </p:spPr>
@@ -17179,7 +16907,7 @@
           </a:ln>
           <a:extLst>
             <a:ext uri="{C572A759-6A51-4108-AA02-DFA0A04FC94B}">
-              <ma14:wrappingTextBoxFlag xmlns="" xmlns:ma14="http://schemas.microsoft.com/office/mac/drawingml/2011/main" val="1"/>
+              <ma14:wrappingTextBoxFlag xmlns:ma14="http://schemas.microsoft.com/office/mac/drawingml/2011/main" xmlns="" val="1"/>
             </a:ext>
           </a:extLst>
         </p:spPr>
@@ -17237,7 +16965,7 @@
           </a:ln>
           <a:extLst>
             <a:ext uri="{C572A759-6A51-4108-AA02-DFA0A04FC94B}">
-              <ma14:wrappingTextBoxFlag xmlns="" xmlns:ma14="http://schemas.microsoft.com/office/mac/drawingml/2011/main" val="1"/>
+              <ma14:wrappingTextBoxFlag xmlns:ma14="http://schemas.microsoft.com/office/mac/drawingml/2011/main" xmlns="" val="1"/>
             </a:ext>
           </a:extLst>
         </p:spPr>
@@ -17387,7 +17115,7 @@
           </a:ln>
           <a:extLst>
             <a:ext uri="{C572A759-6A51-4108-AA02-DFA0A04FC94B}">
-              <ma14:wrappingTextBoxFlag xmlns="" xmlns:ma14="http://schemas.microsoft.com/office/mac/drawingml/2011/main" val="1"/>
+              <ma14:wrappingTextBoxFlag xmlns:ma14="http://schemas.microsoft.com/office/mac/drawingml/2011/main" xmlns="" val="1"/>
             </a:ext>
           </a:extLst>
         </p:spPr>
@@ -17765,7 +17493,7 @@
           </a:ln>
           <a:extLst>
             <a:ext uri="{C572A759-6A51-4108-AA02-DFA0A04FC94B}">
-              <ma14:wrappingTextBoxFlag xmlns="" xmlns:ma14="http://schemas.microsoft.com/office/mac/drawingml/2011/main" val="1"/>
+              <ma14:wrappingTextBoxFlag xmlns:ma14="http://schemas.microsoft.com/office/mac/drawingml/2011/main" xmlns="" val="1"/>
             </a:ext>
           </a:extLst>
         </p:spPr>
@@ -17893,7 +17621,7 @@
                 <a:latin typeface="Calibri" panose="020F0502020204030204" pitchFamily="34" charset="0"/>
                 <a:cs typeface="Calibri" panose="020F0502020204030204" pitchFamily="34" charset="0"/>
               </a:rPr>
-              <a:t> di 15</a:t>
+              <a:t> di 14</a:t>
             </a:r>
           </a:p>
         </p:txBody>
@@ -18126,7 +17854,7 @@
           </a:ln>
           <a:extLst>
             <a:ext uri="{C572A759-6A51-4108-AA02-DFA0A04FC94B}">
-              <ma14:wrappingTextBoxFlag xmlns="" xmlns:ma14="http://schemas.microsoft.com/office/mac/drawingml/2011/main" val="1"/>
+              <ma14:wrappingTextBoxFlag xmlns:ma14="http://schemas.microsoft.com/office/mac/drawingml/2011/main" xmlns="" val="1"/>
             </a:ext>
           </a:extLst>
         </p:spPr>
@@ -18403,7 +18131,7 @@
           </a:prstGeom>
           <a:extLst>
             <a:ext uri="{C572A759-6A51-4108-AA02-DFA0A04FC94B}">
-              <ma14:wrappingTextBoxFlag xmlns="" xmlns:ma14="http://schemas.microsoft.com/office/mac/drawingml/2011/main" val="1"/>
+              <ma14:wrappingTextBoxFlag xmlns:ma14="http://schemas.microsoft.com/office/mac/drawingml/2011/main" xmlns="" val="1"/>
             </a:ext>
           </a:extLst>
         </p:spPr>
@@ -18471,7 +18199,7 @@
           </a:ln>
           <a:extLst>
             <a:ext uri="{C572A759-6A51-4108-AA02-DFA0A04FC94B}">
-              <ma14:wrappingTextBoxFlag xmlns="" xmlns:ma14="http://schemas.microsoft.com/office/mac/drawingml/2011/main" val="1"/>
+              <ma14:wrappingTextBoxFlag xmlns:ma14="http://schemas.microsoft.com/office/mac/drawingml/2011/main" xmlns="" val="1"/>
             </a:ext>
           </a:extLst>
         </p:spPr>
@@ -18529,7 +18257,7 @@
           </a:ln>
           <a:extLst>
             <a:ext uri="{C572A759-6A51-4108-AA02-DFA0A04FC94B}">
-              <ma14:wrappingTextBoxFlag xmlns="" xmlns:ma14="http://schemas.microsoft.com/office/mac/drawingml/2011/main" val="1"/>
+              <ma14:wrappingTextBoxFlag xmlns:ma14="http://schemas.microsoft.com/office/mac/drawingml/2011/main" xmlns="" val="1"/>
             </a:ext>
           </a:extLst>
         </p:spPr>
@@ -18587,7 +18315,7 @@
           </a:ln>
           <a:extLst>
             <a:ext uri="{C572A759-6A51-4108-AA02-DFA0A04FC94B}">
-              <ma14:wrappingTextBoxFlag xmlns="" xmlns:ma14="http://schemas.microsoft.com/office/mac/drawingml/2011/main" val="1"/>
+              <ma14:wrappingTextBoxFlag xmlns:ma14="http://schemas.microsoft.com/office/mac/drawingml/2011/main" xmlns="" val="1"/>
             </a:ext>
           </a:extLst>
         </p:spPr>
@@ -18737,7 +18465,7 @@
           </a:ln>
           <a:extLst>
             <a:ext uri="{C572A759-6A51-4108-AA02-DFA0A04FC94B}">
-              <ma14:wrappingTextBoxFlag xmlns="" xmlns:ma14="http://schemas.microsoft.com/office/mac/drawingml/2011/main" val="1"/>
+              <ma14:wrappingTextBoxFlag xmlns:ma14="http://schemas.microsoft.com/office/mac/drawingml/2011/main" xmlns="" val="1"/>
             </a:ext>
           </a:extLst>
         </p:spPr>
@@ -19115,7 +18843,7 @@
           </a:ln>
           <a:extLst>
             <a:ext uri="{C572A759-6A51-4108-AA02-DFA0A04FC94B}">
-              <ma14:wrappingTextBoxFlag xmlns="" xmlns:ma14="http://schemas.microsoft.com/office/mac/drawingml/2011/main" val="1"/>
+              <ma14:wrappingTextBoxFlag xmlns:ma14="http://schemas.microsoft.com/office/mac/drawingml/2011/main" xmlns="" val="1"/>
             </a:ext>
           </a:extLst>
         </p:spPr>
@@ -19243,7 +18971,7 @@
                 <a:latin typeface="Calibri" panose="020F0502020204030204" pitchFamily="34" charset="0"/>
                 <a:cs typeface="Calibri" panose="020F0502020204030204" pitchFamily="34" charset="0"/>
               </a:rPr>
-              <a:t> di 15</a:t>
+              <a:t> di 14</a:t>
             </a:r>
           </a:p>
         </p:txBody>
@@ -19273,7 +19001,7 @@
           </a:ln>
           <a:extLst>
             <a:ext uri="{C572A759-6A51-4108-AA02-DFA0A04FC94B}">
-              <ma14:wrappingTextBoxFlag xmlns="" xmlns:ma14="http://schemas.microsoft.com/office/mac/drawingml/2011/main" val="1"/>
+              <ma14:wrappingTextBoxFlag xmlns:ma14="http://schemas.microsoft.com/office/mac/drawingml/2011/main" xmlns="" val="1"/>
             </a:ext>
           </a:extLst>
         </p:spPr>

</xml_diff>